<commit_message>
poster v.1.0; new diagram; small spelling bugfixes.
</commit_message>
<xml_diff>
--- a/ubicomp13/poster/ConesC.pptx
+++ b/ubicomp13/poster/ConesC.pptx
@@ -4080,6 +4080,183 @@
       </p:grpSpPr>
       <p:sp>
         <p:nvSpPr>
+          <p:cNvPr id="68" name="Cloud 67"/>
+          <p:cNvSpPr/>
+          <p:nvPr/>
+        </p:nvSpPr>
+        <p:spPr bwMode="auto">
+          <a:xfrm>
+            <a:off x="25218948" y="36739585"/>
+            <a:ext cx="4032226" cy="3672408"/>
+          </a:xfrm>
+          <a:prstGeom prst="cloud">
+            <a:avLst/>
+          </a:prstGeom>
+          <a:solidFill>
+            <a:srgbClr val="CCCCFF"/>
+          </a:solidFill>
+          <a:ln w="9525" cap="flat" cmpd="sng" algn="ctr">
+            <a:solidFill>
+              <a:schemeClr val="tx1"/>
+            </a:solidFill>
+            <a:prstDash val="solid"/>
+            <a:round/>
+            <a:headEnd type="none" w="med" len="med"/>
+            <a:tailEnd type="none" w="med" len="med"/>
+          </a:ln>
+          <a:effectLst/>
+        </p:spPr>
+        <p:txBody>
+          <a:bodyPr vert="horz" wrap="square" lIns="91440" tIns="45720" rIns="91440" bIns="45720" numCol="1" rtlCol="0" anchor="ctr" anchorCtr="0" compatLnSpc="1">
+            <a:prstTxWarp prst="textNoShape">
+              <a:avLst/>
+            </a:prstTxWarp>
+          </a:bodyPr>
+          <a:lstStyle/>
+          <a:p>
+            <a:pPr marL="0" marR="0" indent="0" algn="ctr" defTabSz="914400" rtl="0" eaLnBrk="0" fontAlgn="base" latinLnBrk="0" hangingPunct="0">
+              <a:lnSpc>
+                <a:spcPct val="100000"/>
+              </a:lnSpc>
+              <a:spcBef>
+                <a:spcPct val="0"/>
+              </a:spcBef>
+              <a:spcAft>
+                <a:spcPct val="0"/>
+              </a:spcAft>
+              <a:buClrTx/>
+              <a:buSzTx/>
+              <a:buFontTx/>
+              <a:buNone/>
+              <a:tabLst/>
+            </a:pPr>
+            <a:r>
+              <a:rPr kumimoji="0" lang="en-US" sz="7200" b="1" i="1" u="none" strike="noStrike" cap="none" normalizeH="0" baseline="0" dirty="0" err="1" smtClean="0">
+                <a:ln>
+                  <a:noFill/>
+                </a:ln>
+                <a:solidFill>
+                  <a:schemeClr val="tx1"/>
+                </a:solidFill>
+                <a:effectLst/>
+                <a:latin typeface="+mj-lt"/>
+                <a:ea typeface="ＭＳ Ｐゴシック" charset="-128"/>
+                <a:cs typeface="ＭＳ Ｐゴシック" charset="-128"/>
+              </a:rPr>
+              <a:t>nesC</a:t>
+            </a:r>
+            <a:endParaRPr kumimoji="0" lang="en-US" sz="7200" b="1" i="1" u="none" strike="noStrike" cap="none" normalizeH="0" baseline="0" dirty="0">
+              <a:ln>
+                <a:noFill/>
+              </a:ln>
+              <a:solidFill>
+                <a:schemeClr val="tx1"/>
+              </a:solidFill>
+              <a:effectLst/>
+              <a:latin typeface="+mj-lt"/>
+              <a:ea typeface="ＭＳ Ｐゴシック" charset="-128"/>
+              <a:cs typeface="ＭＳ Ｐゴシック" charset="-128"/>
+            </a:endParaRPr>
+          </a:p>
+        </p:txBody>
+      </p:sp>
+      <p:sp>
+        <p:nvSpPr>
+          <p:cNvPr id="74" name="Curved Down Arrow 73"/>
+          <p:cNvSpPr/>
+          <p:nvPr/>
+        </p:nvSpPr>
+        <p:spPr bwMode="auto">
+          <a:xfrm rot="16200000" flipH="1" flipV="1">
+            <a:off x="21078332" y="38818838"/>
+            <a:ext cx="2160240" cy="916280"/>
+          </a:xfrm>
+          <a:prstGeom prst="curvedDownArrow">
+            <a:avLst>
+              <a:gd name="adj1" fmla="val 72577"/>
+              <a:gd name="adj2" fmla="val 92564"/>
+              <a:gd name="adj3" fmla="val 25000"/>
+            </a:avLst>
+          </a:prstGeom>
+          <a:solidFill>
+            <a:srgbClr val="CCCCFF"/>
+          </a:solidFill>
+          <a:ln w="9525" cap="flat" cmpd="sng" algn="ctr">
+            <a:solidFill>
+              <a:schemeClr val="tx1"/>
+            </a:solidFill>
+            <a:prstDash val="solid"/>
+            <a:round/>
+            <a:headEnd type="none" w="med" len="med"/>
+            <a:tailEnd type="none" w="med" len="med"/>
+          </a:ln>
+          <a:effectLst/>
+        </p:spPr>
+        <p:txBody>
+          <a:bodyPr vert="horz" wrap="square" lIns="91440" tIns="45720" rIns="91440" bIns="45720" numCol="1" rtlCol="0" anchor="t" anchorCtr="0" compatLnSpc="1">
+            <a:prstTxWarp prst="textNoShape">
+              <a:avLst/>
+            </a:prstTxWarp>
+          </a:bodyPr>
+          <a:lstStyle/>
+          <a:p>
+            <a:pPr marL="0" marR="0" indent="0" algn="l" defTabSz="914400" rtl="0" eaLnBrk="0" fontAlgn="base" latinLnBrk="0" hangingPunct="0">
+              <a:lnSpc>
+                <a:spcPct val="100000"/>
+              </a:lnSpc>
+              <a:spcBef>
+                <a:spcPct val="0"/>
+              </a:spcBef>
+              <a:spcAft>
+                <a:spcPct val="0"/>
+              </a:spcAft>
+              <a:buClrTx/>
+              <a:buSzTx/>
+              <a:buFontTx/>
+              <a:buNone/>
+              <a:tabLst/>
+            </a:pPr>
+            <a:endParaRPr kumimoji="0" lang="en-US" sz="2400" b="0" i="0" u="none" strike="noStrike" cap="none" normalizeH="0" baseline="0">
+              <a:ln>
+                <a:noFill/>
+              </a:ln>
+              <a:solidFill>
+                <a:schemeClr val="tx1"/>
+              </a:solidFill>
+              <a:effectLst/>
+              <a:latin typeface="Arial" charset="0"/>
+              <a:ea typeface="ＭＳ Ｐゴシック" charset="-128"/>
+              <a:cs typeface="ＭＳ Ｐゴシック" charset="-128"/>
+            </a:endParaRPr>
+          </a:p>
+        </p:txBody>
+      </p:sp>
+      <p:pic>
+        <p:nvPicPr>
+          <p:cNvPr id="13" name="Picture 12"/>
+          <p:cNvPicPr>
+            <a:picLocks noChangeAspect="1"/>
+          </p:cNvPicPr>
+          <p:nvPr/>
+        </p:nvPicPr>
+        <p:blipFill>
+          <a:blip r:embed="rId3"/>
+          <a:stretch>
+            <a:fillRect/>
+          </a:stretch>
+        </p:blipFill>
+        <p:spPr>
+          <a:xfrm>
+            <a:off x="831061" y="26154408"/>
+            <a:ext cx="5236150" cy="9370551"/>
+          </a:xfrm>
+          <a:prstGeom prst="rect">
+            <a:avLst/>
+          </a:prstGeom>
+        </p:spPr>
+      </p:pic>
+      <p:sp>
+        <p:nvSpPr>
           <p:cNvPr id="7" name="Rectangle 4"/>
           <p:cNvSpPr>
             <a:spLocks noChangeArrowheads="1"/>
@@ -4347,7 +4524,7 @@
                 </a:solidFill>
                 <a:latin typeface="Trebuchet MS" charset="0"/>
               </a:rPr>
-              <a:t>Wireles</a:t>
+              <a:t>Wireless Sensor Networks for Healthcare </a:t>
             </a:r>
             <a:r>
               <a:rPr lang="en-US" sz="7200" b="1" i="1" dirty="0" smtClean="0">
@@ -4356,16 +4533,7 @@
                 </a:solidFill>
                 <a:latin typeface="Trebuchet MS" charset="0"/>
               </a:rPr>
-              <a:t>s Sensor Networks for </a:t>
-            </a:r>
-            <a:r>
-              <a:rPr lang="en-US" sz="7200" b="1" i="1" dirty="0" smtClean="0">
-                <a:solidFill>
-                  <a:schemeClr val="tx2"/>
-                </a:solidFill>
-                <a:latin typeface="Trebuchet MS" charset="0"/>
-              </a:rPr>
-              <a:t>Healthcare Systems</a:t>
+              <a:t>Systems</a:t>
             </a:r>
             <a:endParaRPr lang="en-US" sz="7200" b="1" i="1" dirty="0">
               <a:solidFill>
@@ -4464,7 +4632,7 @@
           <p:nvPr/>
         </p:nvPicPr>
         <p:blipFill>
-          <a:blip r:embed="rId3"/>
+          <a:blip r:embed="rId4"/>
           <a:stretch>
             <a:fillRect/>
           </a:stretch>
@@ -4488,7 +4656,7 @@
           <p:nvPr/>
         </p:nvPicPr>
         <p:blipFill>
-          <a:blip r:embed="rId4"/>
+          <a:blip r:embed="rId5"/>
           <a:stretch>
             <a:fillRect/>
           </a:stretch>
@@ -4600,7 +4768,7 @@
           <p:nvPr/>
         </p:nvPicPr>
         <p:blipFill>
-          <a:blip r:embed="rId5"/>
+          <a:blip r:embed="rId6"/>
           <a:stretch>
             <a:fillRect/>
           </a:stretch>
@@ -4680,7 +4848,7 @@
           <p:nvPr/>
         </p:nvPicPr>
         <p:blipFill>
-          <a:blip r:embed="rId6"/>
+          <a:blip r:embed="rId7"/>
           <a:stretch>
             <a:fillRect/>
           </a:stretch>
@@ -4695,78 +4863,6 @@
           </a:prstGeom>
         </p:spPr>
       </p:pic>
-      <p:pic>
-        <p:nvPicPr>
-          <p:cNvPr id="9" name="Picture 8"/>
-          <p:cNvPicPr>
-            <a:picLocks noChangeAspect="1"/>
-          </p:cNvPicPr>
-          <p:nvPr/>
-        </p:nvPicPr>
-        <p:blipFill>
-          <a:blip r:embed="rId7"/>
-          <a:stretch>
-            <a:fillRect/>
-          </a:stretch>
-        </p:blipFill>
-        <p:spPr>
-          <a:xfrm>
-            <a:off x="1314819" y="26178216"/>
-            <a:ext cx="4714891" cy="8473137"/>
-          </a:xfrm>
-          <a:prstGeom prst="rect">
-            <a:avLst/>
-          </a:prstGeom>
-        </p:spPr>
-      </p:pic>
-      <p:pic>
-        <p:nvPicPr>
-          <p:cNvPr id="17" name="Picture 16"/>
-          <p:cNvPicPr>
-            <a:picLocks noChangeAspect="1"/>
-          </p:cNvPicPr>
-          <p:nvPr/>
-        </p:nvPicPr>
-        <p:blipFill>
-          <a:blip r:embed="rId8"/>
-          <a:stretch>
-            <a:fillRect/>
-          </a:stretch>
-        </p:blipFill>
-        <p:spPr>
-          <a:xfrm>
-            <a:off x="7680171" y="30574034"/>
-            <a:ext cx="4635500" cy="3651250"/>
-          </a:xfrm>
-          <a:prstGeom prst="rect">
-            <a:avLst/>
-          </a:prstGeom>
-        </p:spPr>
-      </p:pic>
-      <p:pic>
-        <p:nvPicPr>
-          <p:cNvPr id="18" name="Picture 17"/>
-          <p:cNvPicPr>
-            <a:picLocks noChangeAspect="1"/>
-          </p:cNvPicPr>
-          <p:nvPr/>
-        </p:nvPicPr>
-        <p:blipFill>
-          <a:blip r:embed="rId9"/>
-          <a:stretch>
-            <a:fillRect/>
-          </a:stretch>
-        </p:blipFill>
-        <p:spPr>
-          <a:xfrm>
-            <a:off x="7905181" y="34627546"/>
-            <a:ext cx="4410490" cy="1008112"/>
-          </a:xfrm>
-          <a:prstGeom prst="rect">
-            <a:avLst/>
-          </a:prstGeom>
-        </p:spPr>
-      </p:pic>
       <p:sp>
         <p:nvSpPr>
           <p:cNvPr id="4" name="TextBox 3"/>
@@ -4775,8 +4871,8 @@
         </p:nvSpPr>
         <p:spPr>
           <a:xfrm>
-            <a:off x="15209614" y="26154409"/>
-            <a:ext cx="13249472" cy="3416320"/>
+            <a:off x="16219608" y="26154409"/>
+            <a:ext cx="12239477" cy="3416320"/>
           </a:xfrm>
           <a:prstGeom prst="rect">
             <a:avLst/>
@@ -4851,7 +4947,7 @@
         </p:nvSpPr>
         <p:spPr bwMode="auto">
           <a:xfrm rot="21420000">
-            <a:off x="15285426" y="30421052"/>
+            <a:off x="16315826" y="30369002"/>
             <a:ext cx="3816424" cy="2304256"/>
           </a:xfrm>
           <a:prstGeom prst="roundRect">
@@ -4961,7 +5057,7 @@
         </p:nvSpPr>
         <p:spPr bwMode="auto">
           <a:xfrm rot="21420000">
-            <a:off x="23404200" y="29997113"/>
+            <a:off x="24434600" y="29945063"/>
             <a:ext cx="3816424" cy="2304256"/>
           </a:xfrm>
           <a:prstGeom prst="roundRect">
@@ -5071,7 +5167,7 @@
         </p:nvSpPr>
         <p:spPr>
           <a:xfrm>
-            <a:off x="20340312" y="33419107"/>
+            <a:off x="21370712" y="33367057"/>
             <a:ext cx="2018347" cy="2018347"/>
           </a:xfrm>
           <a:prstGeom prst="triangle">
@@ -5135,7 +5231,7 @@
         </p:nvSpPr>
         <p:spPr>
           <a:xfrm rot="21429888">
-            <a:off x="15294443" y="32574092"/>
+            <a:off x="16324843" y="32522042"/>
             <a:ext cx="12110085" cy="818103"/>
           </a:xfrm>
           <a:prstGeom prst="rect">
@@ -5199,8 +5295,8 @@
         </p:nvSpPr>
         <p:spPr>
           <a:xfrm rot="21420000">
-            <a:off x="20074826" y="30531782"/>
-            <a:ext cx="2549320" cy="1569660"/>
+            <a:off x="21167855" y="30479732"/>
+            <a:ext cx="2424062" cy="1569660"/>
           </a:xfrm>
           <a:prstGeom prst="rect">
             <a:avLst/>
@@ -5228,6 +5324,7 @@
             </a:r>
           </a:p>
           <a:p>
+            <a:pPr algn="ctr"/>
             <a:r>
               <a:rPr lang="en-US" sz="4800" b="1" i="1" dirty="0" smtClean="0">
                 <a:latin typeface="+mj-lt"/>
@@ -5281,7 +5378,16 @@
                 </a:solidFill>
                 <a:latin typeface="Trebuchet MS" charset="0"/>
               </a:rPr>
-              <a:t>Context-Oriented Programming for Wireless Sensor Networks</a:t>
+              <a:t>Context-Oriented </a:t>
+            </a:r>
+            <a:r>
+              <a:rPr lang="en-US" sz="7200" b="1" i="1" dirty="0" smtClean="0">
+                <a:solidFill>
+                  <a:schemeClr val="tx2"/>
+                </a:solidFill>
+                <a:latin typeface="Trebuchet MS" charset="0"/>
+              </a:rPr>
+              <a:t>Programming for Wireless Sensor Networks</a:t>
             </a:r>
             <a:endParaRPr lang="en-US" sz="7200" b="1" i="1" dirty="0">
               <a:solidFill>
@@ -5354,7 +5460,7 @@
           <p:nvPr/>
         </p:nvPicPr>
         <p:blipFill>
-          <a:blip r:embed="rId10"/>
+          <a:blip r:embed="rId8"/>
           <a:stretch>
             <a:fillRect/>
           </a:stretch>
@@ -5480,7 +5586,7 @@
         </p:nvSpPr>
         <p:spPr>
           <a:xfrm rot="21420000">
-            <a:off x="15202506" y="32570658"/>
+            <a:off x="16232906" y="32518608"/>
             <a:ext cx="12330411" cy="830997"/>
           </a:xfrm>
           <a:prstGeom prst="rect">
@@ -5579,8 +5685,8 @@
         </p:nvSpPr>
         <p:spPr>
           <a:xfrm>
-            <a:off x="519982" y="37819705"/>
-            <a:ext cx="11161240" cy="1200329"/>
+            <a:off x="1036754" y="36739585"/>
+            <a:ext cx="11887553" cy="2585323"/>
           </a:xfrm>
           <a:prstGeom prst="rect">
             <a:avLst/>
@@ -5593,14 +5699,55 @@
           </a:bodyPr>
           <a:lstStyle/>
           <a:p>
-            <a:pPr algn="ctr"/>
-            <a:r>
-              <a:rPr lang="en-US" sz="7200" b="1" i="1" dirty="0" smtClean="0">
+            <a:r>
+              <a:rPr lang="en-US" sz="5400" b="1" i="1" dirty="0" smtClean="0">
                 <a:latin typeface="+mj-lt"/>
               </a:rPr>
-              <a:t>Ongoing Work</a:t>
-            </a:r>
-            <a:endParaRPr lang="en-US" sz="7200" b="1" i="1" dirty="0">
+              <a:t>Ongoing </a:t>
+            </a:r>
+            <a:r>
+              <a:rPr lang="en-US" sz="5400" b="1" i="1" dirty="0" smtClean="0">
+                <a:latin typeface="+mj-lt"/>
+              </a:rPr>
+              <a:t>Work</a:t>
+            </a:r>
+          </a:p>
+          <a:p>
+            <a:pPr marL="857250" indent="-857250">
+              <a:buFont typeface="Arial" panose="020B0604020202020204" pitchFamily="34" charset="0"/>
+              <a:buChar char="•"/>
+            </a:pPr>
+            <a:r>
+              <a:rPr lang="en-US" sz="5400" b="1" i="1" dirty="0" smtClean="0">
+                <a:latin typeface="+mj-lt"/>
+              </a:rPr>
+              <a:t>Implementation of the translator</a:t>
+            </a:r>
+          </a:p>
+          <a:p>
+            <a:pPr marL="857250" indent="-857250">
+              <a:buFont typeface="Arial" panose="020B0604020202020204" pitchFamily="34" charset="0"/>
+              <a:buChar char="•"/>
+            </a:pPr>
+            <a:r>
+              <a:rPr lang="en-US" sz="5400" b="1" i="1" dirty="0" smtClean="0">
+                <a:latin typeface="+mj-lt"/>
+              </a:rPr>
+              <a:t>Evaluation on a </a:t>
+            </a:r>
+            <a:r>
+              <a:rPr lang="en-US" sz="5400" b="1" i="1" dirty="0">
+                <a:latin typeface="+mj-lt"/>
+              </a:rPr>
+              <a:t>r</a:t>
+            </a:r>
+            <a:r>
+              <a:rPr lang="en-US" sz="5400" b="1" i="1" dirty="0" smtClean="0">
+                <a:latin typeface="+mj-lt"/>
+              </a:rPr>
+              <a:t>eal application</a:t>
+            </a:r>
+            <a:endParaRPr lang="en-US" sz="5400" b="1" i="1" dirty="0">
               <a:latin typeface="+mj-lt"/>
             </a:endParaRPr>
           </a:p>
@@ -5614,8 +5761,8 @@
         </p:nvSpPr>
         <p:spPr bwMode="auto">
           <a:xfrm>
-            <a:off x="11681222" y="36739585"/>
-            <a:ext cx="5688632" cy="3672408"/>
+            <a:off x="13293497" y="36739682"/>
+            <a:ext cx="4996830" cy="3672408"/>
           </a:xfrm>
           <a:prstGeom prst="cloud">
             <a:avLst/>
@@ -5696,8 +5843,8 @@
         </p:nvSpPr>
         <p:spPr bwMode="auto">
           <a:xfrm>
-            <a:off x="14777566" y="37891713"/>
-            <a:ext cx="9865096" cy="1296144"/>
+            <a:off x="15209614" y="37891713"/>
+            <a:ext cx="10801200" cy="1296144"/>
           </a:xfrm>
           <a:prstGeom prst="rightArrow">
             <a:avLst>
@@ -5782,105 +5929,35 @@
       </p:sp>
       <p:sp>
         <p:nvSpPr>
-          <p:cNvPr id="68" name="Cloud 67"/>
-          <p:cNvSpPr/>
-          <p:nvPr/>
-        </p:nvSpPr>
-        <p:spPr bwMode="auto">
-          <a:xfrm>
-            <a:off x="24642662" y="36739585"/>
-            <a:ext cx="4320480" cy="3672408"/>
-          </a:xfrm>
-          <a:prstGeom prst="cloud">
-            <a:avLst/>
-          </a:prstGeom>
-          <a:solidFill>
-            <a:srgbClr val="CCCCFF"/>
-          </a:solidFill>
-          <a:ln w="9525" cap="flat" cmpd="sng" algn="ctr">
-            <a:solidFill>
-              <a:schemeClr val="tx1"/>
-            </a:solidFill>
-            <a:prstDash val="solid"/>
-            <a:round/>
-            <a:headEnd type="none" w="med" len="med"/>
-            <a:tailEnd type="none" w="med" len="med"/>
-          </a:ln>
-          <a:effectLst/>
-        </p:spPr>
-        <p:txBody>
-          <a:bodyPr vert="horz" wrap="square" lIns="91440" tIns="45720" rIns="91440" bIns="45720" numCol="1" rtlCol="0" anchor="ctr" anchorCtr="0" compatLnSpc="1">
-            <a:prstTxWarp prst="textNoShape">
-              <a:avLst/>
-            </a:prstTxWarp>
-          </a:bodyPr>
-          <a:lstStyle/>
-          <a:p>
-            <a:pPr marL="0" marR="0" indent="0" algn="ctr" defTabSz="914400" rtl="0" eaLnBrk="0" fontAlgn="base" latinLnBrk="0" hangingPunct="0">
-              <a:lnSpc>
-                <a:spcPct val="100000"/>
-              </a:lnSpc>
-              <a:spcBef>
-                <a:spcPct val="0"/>
-              </a:spcBef>
-              <a:spcAft>
-                <a:spcPct val="0"/>
-              </a:spcAft>
-              <a:buClrTx/>
-              <a:buSzTx/>
-              <a:buFontTx/>
-              <a:buNone/>
-              <a:tabLst/>
-            </a:pPr>
-            <a:r>
-              <a:rPr kumimoji="0" lang="en-US" sz="7200" b="1" i="1" u="none" strike="noStrike" cap="none" normalizeH="0" baseline="0" dirty="0" err="1" smtClean="0">
-                <a:ln>
-                  <a:noFill/>
-                </a:ln>
-                <a:solidFill>
-                  <a:schemeClr val="tx1"/>
-                </a:solidFill>
-                <a:effectLst/>
-                <a:latin typeface="+mj-lt"/>
-                <a:ea typeface="ＭＳ Ｐゴシック" charset="-128"/>
-                <a:cs typeface="ＭＳ Ｐゴシック" charset="-128"/>
-              </a:rPr>
-              <a:t>nesC</a:t>
-            </a:r>
-            <a:endParaRPr kumimoji="0" lang="en-US" sz="7200" b="1" i="1" u="none" strike="noStrike" cap="none" normalizeH="0" baseline="0" dirty="0">
-              <a:ln>
-                <a:noFill/>
-              </a:ln>
-              <a:solidFill>
-                <a:schemeClr val="tx1"/>
-              </a:solidFill>
-              <a:effectLst/>
-              <a:latin typeface="+mj-lt"/>
-              <a:ea typeface="ＭＳ Ｐゴシック" charset="-128"/>
-              <a:cs typeface="ＭＳ Ｐゴシック" charset="-128"/>
-            </a:endParaRPr>
-          </a:p>
-        </p:txBody>
-      </p:sp>
-      <p:sp>
-        <p:nvSpPr>
           <p:cNvPr id="71" name="Rounded Rectangle 70"/>
           <p:cNvSpPr/>
           <p:nvPr/>
         </p:nvSpPr>
         <p:spPr bwMode="auto">
           <a:xfrm>
-            <a:off x="18224038" y="36923665"/>
-            <a:ext cx="4680520" cy="3632344"/>
+            <a:off x="19328230" y="36878817"/>
+            <a:ext cx="4852814" cy="3632344"/>
           </a:xfrm>
           <a:prstGeom prst="roundRect">
             <a:avLst/>
           </a:prstGeom>
-          <a:solidFill>
-            <a:srgbClr val="FFFACD">
-              <a:alpha val="50000"/>
-            </a:srgbClr>
-          </a:solidFill>
+          <a:gradFill flip="none" rotWithShape="1">
+            <a:gsLst>
+              <a:gs pos="20000">
+                <a:srgbClr val="FFFACD"/>
+              </a:gs>
+              <a:gs pos="50000">
+                <a:srgbClr val="FFFACD">
+                  <a:alpha val="0"/>
+                </a:srgbClr>
+              </a:gs>
+              <a:gs pos="80000">
+                <a:srgbClr val="FFFACD"/>
+              </a:gs>
+            </a:gsLst>
+            <a:lin ang="0" scaled="0"/>
+            <a:tileRect/>
+          </a:gradFill>
           <a:ln w="28575" cap="flat" cmpd="sng" algn="ctr">
             <a:solidFill>
               <a:schemeClr val="tx1"/>
@@ -5937,13 +6014,13 @@
       </p:sp>
       <p:sp>
         <p:nvSpPr>
-          <p:cNvPr id="74" name="Curved Down Arrow 73"/>
+          <p:cNvPr id="75" name="Curved Down Arrow 74"/>
           <p:cNvSpPr/>
           <p:nvPr/>
         </p:nvSpPr>
         <p:spPr bwMode="auto">
-          <a:xfrm rot="16200000" flipH="1" flipV="1">
-            <a:off x="19934144" y="38837729"/>
+          <a:xfrm rot="5400000" flipH="1" flipV="1">
+            <a:off x="20127204" y="38684869"/>
             <a:ext cx="2160240" cy="916280"/>
           </a:xfrm>
           <a:prstGeom prst="curvedDownArrow">
@@ -6008,77 +6085,6 @@
       </p:sp>
       <p:sp>
         <p:nvSpPr>
-          <p:cNvPr id="75" name="Curved Down Arrow 74"/>
-          <p:cNvSpPr/>
-          <p:nvPr/>
-        </p:nvSpPr>
-        <p:spPr bwMode="auto">
-          <a:xfrm rot="5400000" flipH="1" flipV="1">
-            <a:off x="18999946" y="38729717"/>
-            <a:ext cx="2160240" cy="916280"/>
-          </a:xfrm>
-          <a:prstGeom prst="curvedDownArrow">
-            <a:avLst>
-              <a:gd name="adj1" fmla="val 72577"/>
-              <a:gd name="adj2" fmla="val 92564"/>
-              <a:gd name="adj3" fmla="val 25000"/>
-            </a:avLst>
-          </a:prstGeom>
-          <a:solidFill>
-            <a:srgbClr val="CCCCFF"/>
-          </a:solidFill>
-          <a:ln w="9525" cap="flat" cmpd="sng" algn="ctr">
-            <a:solidFill>
-              <a:schemeClr val="tx1"/>
-            </a:solidFill>
-            <a:prstDash val="solid"/>
-            <a:round/>
-            <a:headEnd type="none" w="med" len="med"/>
-            <a:tailEnd type="none" w="med" len="med"/>
-          </a:ln>
-          <a:effectLst/>
-        </p:spPr>
-        <p:txBody>
-          <a:bodyPr vert="horz" wrap="square" lIns="91440" tIns="45720" rIns="91440" bIns="45720" numCol="1" rtlCol="0" anchor="t" anchorCtr="0" compatLnSpc="1">
-            <a:prstTxWarp prst="textNoShape">
-              <a:avLst/>
-            </a:prstTxWarp>
-          </a:bodyPr>
-          <a:lstStyle/>
-          <a:p>
-            <a:pPr marL="0" marR="0" indent="0" algn="l" defTabSz="914400" rtl="0" eaLnBrk="0" fontAlgn="base" latinLnBrk="0" hangingPunct="0">
-              <a:lnSpc>
-                <a:spcPct val="100000"/>
-              </a:lnSpc>
-              <a:spcBef>
-                <a:spcPct val="0"/>
-              </a:spcBef>
-              <a:spcAft>
-                <a:spcPct val="0"/>
-              </a:spcAft>
-              <a:buClrTx/>
-              <a:buSzTx/>
-              <a:buFontTx/>
-              <a:buNone/>
-              <a:tabLst/>
-            </a:pPr>
-            <a:endParaRPr kumimoji="0" lang="en-US" sz="2400" b="0" i="0" u="none" strike="noStrike" cap="none" normalizeH="0" baseline="0">
-              <a:ln>
-                <a:noFill/>
-              </a:ln>
-              <a:solidFill>
-                <a:schemeClr val="tx1"/>
-              </a:solidFill>
-              <a:effectLst/>
-              <a:latin typeface="Arial" charset="0"/>
-              <a:ea typeface="ＭＳ Ｐゴシック" charset="-128"/>
-              <a:cs typeface="ＭＳ Ｐゴシック" charset="-128"/>
-            </a:endParaRPr>
-          </a:p>
-        </p:txBody>
-      </p:sp>
-      <p:sp>
-        <p:nvSpPr>
           <p:cNvPr id="5" name="TextBox 4"/>
           <p:cNvSpPr txBox="1"/>
           <p:nvPr/>
@@ -6141,14 +6147,130 @@
       </p:sp>
       <p:sp>
         <p:nvSpPr>
+          <p:cNvPr id="25" name="TextBox 24"/>
+          <p:cNvSpPr txBox="1"/>
+          <p:nvPr/>
+        </p:nvSpPr>
+        <p:spPr>
+          <a:xfrm>
+            <a:off x="1314819" y="9160521"/>
+            <a:ext cx="16487083" cy="5816977"/>
+          </a:xfrm>
+          <a:prstGeom prst="rect">
+            <a:avLst/>
+          </a:prstGeom>
+          <a:noFill/>
+        </p:spPr>
+        <p:txBody>
+          <a:bodyPr wrap="square" rtlCol="0">
+            <a:spAutoFit/>
+          </a:bodyPr>
+          <a:lstStyle/>
+          <a:p>
+            <a:pPr marL="685800" indent="-685800">
+              <a:buFont typeface="Arial" panose="020B0604020202020204" pitchFamily="34" charset="0"/>
+              <a:buChar char="•"/>
+            </a:pPr>
+            <a:r>
+              <a:rPr lang="en-US" sz="5400" b="1" i="1" dirty="0" smtClean="0">
+                <a:latin typeface="+mj-lt"/>
+              </a:rPr>
+              <a:t>Should save energy but provide a high quality of service</a:t>
+            </a:r>
+          </a:p>
+          <a:p>
+            <a:pPr marL="685800" indent="-685800">
+              <a:buFont typeface="Arial" panose="020B0604020202020204" pitchFamily="34" charset="0"/>
+              <a:buChar char="•"/>
+            </a:pPr>
+            <a:r>
+              <a:rPr lang="en-US" sz="5400" b="1" i="1" dirty="0" smtClean="0">
+                <a:latin typeface="+mj-lt"/>
+              </a:rPr>
+              <a:t>Should transmit data if the base station is in the reach</a:t>
+            </a:r>
+          </a:p>
+          <a:p>
+            <a:pPr marL="685800" indent="-685800">
+              <a:buFont typeface="Arial" panose="020B0604020202020204" pitchFamily="34" charset="0"/>
+              <a:buChar char="•"/>
+            </a:pPr>
+            <a:r>
+              <a:rPr lang="en-US" sz="5400" b="1" i="1" dirty="0" smtClean="0">
+                <a:latin typeface="+mj-lt"/>
+              </a:rPr>
+              <a:t>Should locally log data in infrastructure-less situations</a:t>
+            </a:r>
+          </a:p>
+          <a:p>
+            <a:pPr marL="685800" indent="-685800">
+              <a:buFont typeface="Arial" panose="020B0604020202020204" pitchFamily="34" charset="0"/>
+              <a:buChar char="•"/>
+            </a:pPr>
+            <a:endParaRPr lang="en-US" sz="4800" b="1" i="1" dirty="0">
+              <a:latin typeface="+mj-lt"/>
+            </a:endParaRPr>
+          </a:p>
+        </p:txBody>
+      </p:sp>
+      <p:pic>
+        <p:nvPicPr>
+          <p:cNvPr id="11" name="Picture 10"/>
+          <p:cNvPicPr>
+            <a:picLocks noChangeAspect="1"/>
+          </p:cNvPicPr>
+          <p:nvPr/>
+        </p:nvPicPr>
+        <p:blipFill>
+          <a:blip r:embed="rId9"/>
+          <a:stretch>
+            <a:fillRect/>
+          </a:stretch>
+        </p:blipFill>
+        <p:spPr>
+          <a:xfrm>
+            <a:off x="6922719" y="30100738"/>
+            <a:ext cx="3741627" cy="3228294"/>
+          </a:xfrm>
+          <a:prstGeom prst="rect">
+            <a:avLst/>
+          </a:prstGeom>
+        </p:spPr>
+      </p:pic>
+      <p:pic>
+        <p:nvPicPr>
+          <p:cNvPr id="12" name="Picture 11"/>
+          <p:cNvPicPr>
+            <a:picLocks noChangeAspect="1"/>
+          </p:cNvPicPr>
+          <p:nvPr/>
+        </p:nvPicPr>
+        <p:blipFill>
+          <a:blip r:embed="rId10"/>
+          <a:stretch>
+            <a:fillRect/>
+          </a:stretch>
+        </p:blipFill>
+        <p:spPr>
+          <a:xfrm>
+            <a:off x="10870212" y="30108895"/>
+            <a:ext cx="3741627" cy="4138304"/>
+          </a:xfrm>
+          <a:prstGeom prst="rect">
+            <a:avLst/>
+          </a:prstGeom>
+        </p:spPr>
+      </p:pic>
+      <p:sp>
+        <p:nvSpPr>
           <p:cNvPr id="48" name="Right Arrow 47"/>
           <p:cNvSpPr/>
           <p:nvPr/>
         </p:nvSpPr>
         <p:spPr bwMode="auto">
           <a:xfrm>
-            <a:off x="4690897" y="31025511"/>
-            <a:ext cx="3168352" cy="828092"/>
+            <a:off x="4144964" y="33419107"/>
+            <a:ext cx="6952034" cy="828092"/>
           </a:xfrm>
           <a:prstGeom prst="rightArrow">
             <a:avLst>
@@ -6158,7 +6280,7 @@
           </a:prstGeom>
           <a:gradFill flip="none" rotWithShape="1">
             <a:gsLst>
-              <a:gs pos="100000">
+              <a:gs pos="22000">
                 <a:srgbClr val="CCCCFF"/>
               </a:gs>
               <a:gs pos="0">
@@ -6233,106 +6355,14 @@
       </p:sp>
       <p:sp>
         <p:nvSpPr>
-          <p:cNvPr id="25" name="TextBox 24"/>
-          <p:cNvSpPr txBox="1"/>
-          <p:nvPr/>
-        </p:nvSpPr>
-        <p:spPr>
-          <a:xfrm>
-            <a:off x="1314819" y="9160521"/>
-            <a:ext cx="16487083" cy="5816977"/>
-          </a:xfrm>
-          <a:prstGeom prst="rect">
-            <a:avLst/>
-          </a:prstGeom>
-          <a:noFill/>
-        </p:spPr>
-        <p:txBody>
-          <a:bodyPr wrap="square" rtlCol="0">
-            <a:spAutoFit/>
-          </a:bodyPr>
-          <a:lstStyle/>
-          <a:p>
-            <a:pPr marL="685800" indent="-685800">
-              <a:buFont typeface="Arial" panose="020B0604020202020204" pitchFamily="34" charset="0"/>
-              <a:buChar char="•"/>
-            </a:pPr>
-            <a:r>
-              <a:rPr lang="en-US" sz="5400" b="1" i="1" dirty="0" smtClean="0">
-                <a:latin typeface="+mj-lt"/>
-              </a:rPr>
-              <a:t>Should save energy but provide a high quality of service</a:t>
-            </a:r>
-          </a:p>
-          <a:p>
-            <a:pPr marL="685800" indent="-685800">
-              <a:buFont typeface="Arial" panose="020B0604020202020204" pitchFamily="34" charset="0"/>
-              <a:buChar char="•"/>
-            </a:pPr>
-            <a:r>
-              <a:rPr lang="en-US" sz="5400" b="1" i="1" dirty="0" smtClean="0">
-                <a:latin typeface="+mj-lt"/>
-              </a:rPr>
-              <a:t>Should transmit data if the base station is in the reach</a:t>
-            </a:r>
-          </a:p>
-          <a:p>
-            <a:pPr marL="685800" indent="-685800">
-              <a:buFont typeface="Arial" panose="020B0604020202020204" pitchFamily="34" charset="0"/>
-              <a:buChar char="•"/>
-            </a:pPr>
-            <a:r>
-              <a:rPr lang="en-US" sz="5400" b="1" i="1" dirty="0" smtClean="0">
-                <a:latin typeface="+mj-lt"/>
-              </a:rPr>
-              <a:t>Should locally log data in infrastructure-less situations</a:t>
-            </a:r>
-          </a:p>
-          <a:p>
-            <a:pPr marL="685800" indent="-685800">
-              <a:buFont typeface="Arial" panose="020B0604020202020204" pitchFamily="34" charset="0"/>
-              <a:buChar char="•"/>
-            </a:pPr>
-            <a:endParaRPr lang="en-US" sz="4800" b="1" i="1" dirty="0">
-              <a:latin typeface="+mj-lt"/>
-            </a:endParaRPr>
-          </a:p>
-        </p:txBody>
-      </p:sp>
-      <p:pic>
-        <p:nvPicPr>
-          <p:cNvPr id="26" name="Picture 25"/>
-          <p:cNvPicPr>
-            <a:picLocks noChangeAspect="1"/>
-          </p:cNvPicPr>
-          <p:nvPr/>
-        </p:nvPicPr>
-        <p:blipFill>
-          <a:blip r:embed="rId11"/>
-          <a:stretch>
-            <a:fillRect/>
-          </a:stretch>
-        </p:blipFill>
-        <p:spPr>
-          <a:xfrm>
-            <a:off x="7549787" y="26593800"/>
-            <a:ext cx="4765884" cy="3761263"/>
-          </a:xfrm>
-          <a:prstGeom prst="rect">
-            <a:avLst/>
-          </a:prstGeom>
-        </p:spPr>
-      </p:pic>
-      <p:sp>
-        <p:nvSpPr>
           <p:cNvPr id="49" name="Right Arrow 48"/>
           <p:cNvSpPr/>
           <p:nvPr/>
         </p:nvSpPr>
         <p:spPr bwMode="auto">
           <a:xfrm>
-            <a:off x="2702991" y="29478000"/>
-            <a:ext cx="5174836" cy="852873"/>
+            <a:off x="1600102" y="31638435"/>
+            <a:ext cx="5556485" cy="852873"/>
           </a:xfrm>
           <a:prstGeom prst="rightArrow">
             <a:avLst>
@@ -6342,7 +6372,7 @@
           </a:prstGeom>
           <a:gradFill flip="none" rotWithShape="1">
             <a:gsLst>
-              <a:gs pos="100000">
+              <a:gs pos="67000">
                 <a:srgbClr val="FEFBCB"/>
               </a:gs>
               <a:gs pos="0">
@@ -6411,6 +6441,206 @@
               <a:latin typeface="Arial" charset="0"/>
               <a:ea typeface="ＭＳ Ｐゴシック" charset="-128"/>
               <a:cs typeface="ＭＳ Ｐゴシック" charset="-128"/>
+            </a:endParaRPr>
+          </a:p>
+        </p:txBody>
+      </p:sp>
+      <p:pic>
+        <p:nvPicPr>
+          <p:cNvPr id="14" name="Picture 13"/>
+          <p:cNvPicPr>
+            <a:picLocks noChangeAspect="1"/>
+          </p:cNvPicPr>
+          <p:nvPr/>
+        </p:nvPicPr>
+        <p:blipFill>
+          <a:blip r:embed="rId11"/>
+          <a:stretch>
+            <a:fillRect/>
+          </a:stretch>
+        </p:blipFill>
+        <p:spPr>
+          <a:xfrm>
+            <a:off x="9081308" y="27136650"/>
+            <a:ext cx="3454023" cy="1421807"/>
+          </a:xfrm>
+          <a:prstGeom prst="rect">
+            <a:avLst/>
+          </a:prstGeom>
+        </p:spPr>
+      </p:pic>
+      <p:sp>
+        <p:nvSpPr>
+          <p:cNvPr id="15" name="TextBox 14"/>
+          <p:cNvSpPr txBox="1"/>
+          <p:nvPr/>
+        </p:nvSpPr>
+        <p:spPr>
+          <a:xfrm>
+            <a:off x="6568654" y="26214766"/>
+            <a:ext cx="8473720" cy="923330"/>
+          </a:xfrm>
+          <a:prstGeom prst="rect">
+            <a:avLst/>
+          </a:prstGeom>
+          <a:noFill/>
+        </p:spPr>
+        <p:txBody>
+          <a:bodyPr wrap="square" rtlCol="0">
+            <a:spAutoFit/>
+          </a:bodyPr>
+          <a:lstStyle/>
+          <a:p>
+            <a:pPr algn="ctr"/>
+            <a:r>
+              <a:rPr lang="en-US" sz="5400" b="1" i="1" dirty="0" smtClean="0">
+                <a:latin typeface="+mj-lt"/>
+              </a:rPr>
+              <a:t>Usage example</a:t>
+            </a:r>
+            <a:endParaRPr lang="en-US" sz="5400" b="1" i="1" dirty="0">
+              <a:latin typeface="+mj-lt"/>
+            </a:endParaRPr>
+          </a:p>
+        </p:txBody>
+      </p:sp>
+      <p:sp>
+        <p:nvSpPr>
+          <p:cNvPr id="46" name="TextBox 45"/>
+          <p:cNvSpPr txBox="1"/>
+          <p:nvPr/>
+        </p:nvSpPr>
+        <p:spPr>
+          <a:xfrm>
+            <a:off x="6568654" y="28817368"/>
+            <a:ext cx="8473720" cy="923330"/>
+          </a:xfrm>
+          <a:prstGeom prst="rect">
+            <a:avLst/>
+          </a:prstGeom>
+          <a:noFill/>
+        </p:spPr>
+        <p:txBody>
+          <a:bodyPr wrap="square" rtlCol="0">
+            <a:spAutoFit/>
+          </a:bodyPr>
+          <a:lstStyle/>
+          <a:p>
+            <a:pPr algn="ctr"/>
+            <a:r>
+              <a:rPr lang="en-US" sz="5400" b="1" i="1" dirty="0" smtClean="0">
+                <a:latin typeface="+mj-lt"/>
+              </a:rPr>
+              <a:t>Mapping</a:t>
+            </a:r>
+            <a:endParaRPr lang="en-US" sz="5400" b="1" i="1" dirty="0">
+              <a:latin typeface="+mj-lt"/>
+            </a:endParaRPr>
+          </a:p>
+        </p:txBody>
+      </p:sp>
+      <p:sp>
+        <p:nvSpPr>
+          <p:cNvPr id="52" name="Rectangle 7"/>
+          <p:cNvSpPr>
+            <a:spLocks noRot="1" noChangeArrowheads="1"/>
+          </p:cNvSpPr>
+          <p:nvPr/>
+        </p:nvSpPr>
+        <p:spPr bwMode="auto">
+          <a:xfrm>
+            <a:off x="6568654" y="26226417"/>
+            <a:ext cx="8473720" cy="2434161"/>
+          </a:xfrm>
+          <a:prstGeom prst="rect">
+            <a:avLst/>
+          </a:prstGeom>
+          <a:noFill/>
+          <a:ln w="9525">
+            <a:solidFill>
+              <a:schemeClr val="tx2"/>
+            </a:solidFill>
+            <a:round/>
+            <a:headEnd/>
+            <a:tailEnd/>
+          </a:ln>
+          <a:effectLst/>
+        </p:spPr>
+        <p:txBody>
+          <a:bodyPr lIns="347946" tIns="173974" rIns="347946" bIns="173974">
+            <a:prstTxWarp prst="textNoShape">
+              <a:avLst/>
+            </a:prstTxWarp>
+          </a:bodyPr>
+          <a:lstStyle/>
+          <a:p>
+            <a:pPr defTabSz="830263" eaLnBrk="1" hangingPunct="1">
+              <a:lnSpc>
+                <a:spcPct val="120000"/>
+              </a:lnSpc>
+              <a:spcBef>
+                <a:spcPts val="24"/>
+              </a:spcBef>
+              <a:buClr>
+                <a:schemeClr val="accent2"/>
+              </a:buClr>
+              <a:buSzPct val="90000"/>
+            </a:pPr>
+            <a:endParaRPr lang="en-US" sz="4400" dirty="0" smtClean="0">
+              <a:latin typeface="Trebuchet MS" charset="0"/>
+            </a:endParaRPr>
+          </a:p>
+        </p:txBody>
+      </p:sp>
+      <p:sp>
+        <p:nvSpPr>
+          <p:cNvPr id="55" name="Rectangle 7"/>
+          <p:cNvSpPr>
+            <a:spLocks noRot="1" noChangeArrowheads="1"/>
+          </p:cNvSpPr>
+          <p:nvPr/>
+        </p:nvSpPr>
+        <p:spPr bwMode="auto">
+          <a:xfrm>
+            <a:off x="6568654" y="28836948"/>
+            <a:ext cx="8473720" cy="6548456"/>
+          </a:xfrm>
+          <a:prstGeom prst="rect">
+            <a:avLst/>
+          </a:prstGeom>
+          <a:noFill/>
+          <a:ln w="9525">
+            <a:solidFill>
+              <a:schemeClr val="tx2"/>
+            </a:solidFill>
+            <a:round/>
+            <a:headEnd/>
+            <a:tailEnd/>
+          </a:ln>
+          <a:effectLst/>
+        </p:spPr>
+        <p:txBody>
+          <a:bodyPr lIns="347946" tIns="173974" rIns="347946" bIns="173974">
+            <a:prstTxWarp prst="textNoShape">
+              <a:avLst/>
+            </a:prstTxWarp>
+          </a:bodyPr>
+          <a:lstStyle/>
+          <a:p>
+            <a:pPr defTabSz="830263" eaLnBrk="1" hangingPunct="1">
+              <a:lnSpc>
+                <a:spcPct val="120000"/>
+              </a:lnSpc>
+              <a:spcBef>
+                <a:spcPts val="24"/>
+              </a:spcBef>
+              <a:buClr>
+                <a:schemeClr val="accent2"/>
+              </a:buClr>
+              <a:buSzPct val="90000"/>
+            </a:pPr>
+            <a:endParaRPr lang="en-US" sz="4400" dirty="0" smtClean="0">
+              <a:latin typeface="Trebuchet MS" charset="0"/>
             </a:endParaRPr>
           </a:p>
         </p:txBody>

</xml_diff>

<commit_message>
Another small spelling bugfix
</commit_message>
<xml_diff>
--- a/ubicomp13/poster/ConesC.pptx
+++ b/ubicomp13/poster/ConesC.pptx
@@ -4325,8 +4325,38 @@
               <a:t>Afanasov</a:t>
             </a:r>
             <a:r>
+              <a:rPr lang="en-US" sz="3600" baseline="30000" dirty="0"/>
+              <a:t>⋆</a:t>
+            </a:r>
+            <a:r>
               <a:rPr lang="en-US" sz="3600" dirty="0" smtClean="0"/>
               <a:t>, </a:t>
+            </a:r>
+            <a:r>
+              <a:rPr lang="en-US" sz="3600" dirty="0">
+                <a:solidFill>
+                  <a:schemeClr val="tx2"/>
+                </a:solidFill>
+                <a:latin typeface="Trebuchet MS" charset="0"/>
+              </a:rPr>
+              <a:t>Luca </a:t>
+            </a:r>
+            <a:r>
+              <a:rPr lang="en-US" sz="3600" dirty="0" err="1">
+                <a:solidFill>
+                  <a:schemeClr val="tx2"/>
+                </a:solidFill>
+                <a:latin typeface="Trebuchet MS" charset="0"/>
+              </a:rPr>
+              <a:t>Mottola</a:t>
+            </a:r>
+            <a:r>
+              <a:rPr lang="en-US" sz="3600" baseline="30000" dirty="0" smtClean="0"/>
+              <a:t>†</a:t>
+            </a:r>
+            <a:r>
+              <a:rPr lang="en-US" sz="3600" baseline="30000" dirty="0"/>
+              <a:t>⋆</a:t>
             </a:r>
             <a:r>
               <a:rPr lang="en-US" sz="3600" dirty="0" smtClean="0">
@@ -4335,16 +4365,7 @@
                 </a:solidFill>
                 <a:latin typeface="Trebuchet MS" charset="0"/>
               </a:rPr>
-              <a:t>Luca </a:t>
-            </a:r>
-            <a:r>
-              <a:rPr lang="en-US" sz="3600" dirty="0" err="1" smtClean="0">
-                <a:solidFill>
-                  <a:schemeClr val="tx2"/>
-                </a:solidFill>
-                <a:latin typeface="Trebuchet MS" charset="0"/>
-              </a:rPr>
-              <a:t>Mottola</a:t>
+              <a:t>, </a:t>
             </a:r>
             <a:r>
               <a:rPr lang="en-US" sz="3600" dirty="0" smtClean="0">
@@ -4353,7 +4374,7 @@
                 </a:solidFill>
                 <a:latin typeface="Trebuchet MS" charset="0"/>
               </a:rPr>
-              <a:t>, Carlo </a:t>
+              <a:t>Carlo </a:t>
             </a:r>
             <a:r>
               <a:rPr lang="en-US" sz="3600" dirty="0" err="1" smtClean="0">
@@ -4363,6 +4384,10 @@
                 <a:latin typeface="Trebuchet MS" charset="0"/>
               </a:rPr>
               <a:t>Ghezzi</a:t>
+            </a:r>
+            <a:r>
+              <a:rPr lang="en-US" sz="3600" baseline="30000" dirty="0"/>
+              <a:t>⋆</a:t>
             </a:r>
             <a:endParaRPr lang="en-US" sz="3600" dirty="0" smtClean="0">
               <a:solidFill>
@@ -4381,12 +4406,33 @@
               </a:spcBef>
             </a:pPr>
             <a:r>
+              <a:rPr lang="en-US" sz="3600" baseline="30000" dirty="0"/>
+              <a:t>†</a:t>
+            </a:r>
+            <a:r>
+              <a:rPr lang="en-US" sz="3600" dirty="0">
+                <a:solidFill>
+                  <a:schemeClr val="tx2"/>
+                </a:solidFill>
+                <a:latin typeface="Trebuchet MS" charset="0"/>
+              </a:rPr>
+              <a:t>Swedish Institute of Computer Science (SICS), </a:t>
+            </a:r>
+            <a:r>
+              <a:rPr lang="en-US" sz="3600" baseline="30000" dirty="0"/>
+              <a:t>⋆</a:t>
+            </a:r>
+            <a:r>
               <a:rPr lang="en-US" sz="3600" dirty="0" err="1" smtClean="0"/>
               <a:t>Politecnico</a:t>
             </a:r>
             <a:r>
               <a:rPr lang="en-US" sz="3600" dirty="0" smtClean="0"/>
-              <a:t> di Milano (Italy)</a:t>
+              <a:t> </a:t>
+            </a:r>
+            <a:r>
+              <a:rPr lang="en-US" sz="3600" dirty="0" smtClean="0"/>
+              <a:t>di Milano (Italy)</a:t>
             </a:r>
             <a:endParaRPr lang="en-US" sz="3600" dirty="0" smtClean="0">
               <a:solidFill>
@@ -4524,16 +4570,7 @@
                 </a:solidFill>
                 <a:latin typeface="Trebuchet MS" charset="0"/>
               </a:rPr>
-              <a:t>Wireless Sensor Networks for Healthcare </a:t>
-            </a:r>
-            <a:r>
-              <a:rPr lang="en-US" sz="7200" b="1" i="1" dirty="0" smtClean="0">
-                <a:solidFill>
-                  <a:schemeClr val="tx2"/>
-                </a:solidFill>
-                <a:latin typeface="Trebuchet MS" charset="0"/>
-              </a:rPr>
-              <a:t>Systems</a:t>
+              <a:t>Wireless Sensor Networks for Healthcare Systems</a:t>
             </a:r>
             <a:endParaRPr lang="en-US" sz="7200" b="1" i="1" dirty="0">
               <a:solidFill>
@@ -5378,16 +5415,7 @@
                 </a:solidFill>
                 <a:latin typeface="Trebuchet MS" charset="0"/>
               </a:rPr>
-              <a:t>Context-Oriented </a:t>
-            </a:r>
-            <a:r>
-              <a:rPr lang="en-US" sz="7200" b="1" i="1" dirty="0" smtClean="0">
-                <a:solidFill>
-                  <a:schemeClr val="tx2"/>
-                </a:solidFill>
-                <a:latin typeface="Trebuchet MS" charset="0"/>
-              </a:rPr>
-              <a:t>Programming for Wireless Sensor Networks</a:t>
+              <a:t>Context-Oriented Programming for Wireless Sensor Networks</a:t>
             </a:r>
             <a:endParaRPr lang="en-US" sz="7200" b="1" i="1" dirty="0">
               <a:solidFill>
@@ -5703,13 +5731,7 @@
               <a:rPr lang="en-US" sz="5400" b="1" i="1" dirty="0" smtClean="0">
                 <a:latin typeface="+mj-lt"/>
               </a:rPr>
-              <a:t>Ongoing </a:t>
-            </a:r>
-            <a:r>
-              <a:rPr lang="en-US" sz="5400" b="1" i="1" dirty="0" smtClean="0">
-                <a:latin typeface="+mj-lt"/>
-              </a:rPr>
-              <a:t>Work</a:t>
+              <a:t>Ongoing Work</a:t>
             </a:r>
           </a:p>
           <a:p>

</xml_diff>

<commit_message>
Poster was slightly changed
</commit_message>
<xml_diff>
--- a/ubicomp13/poster/ConesC.pptx
+++ b/ubicomp13/poster/ConesC.pptx
@@ -142,7 +142,7 @@
   </p:defaultTextStyle>
   <p:extLst>
     <p:ext uri="{EFAFB233-063F-42B5-8137-9DF3F51BA10A}">
-      <p15:sldGuideLst xmlns:p15="http://schemas.microsoft.com/office/powerpoint/2012/main">
+      <p15:sldGuideLst xmlns:p15="http://schemas.microsoft.com/office/powerpoint/2012/main" xmlns="">
         <p15:guide id="1" orient="horz" pos="13483">
           <p15:clr>
             <a:srgbClr val="A4A3A4"/>
@@ -4342,7 +4342,7 @@
               <a:t>Luca </a:t>
             </a:r>
             <a:r>
-              <a:rPr lang="en-US" sz="3600" dirty="0" err="1">
+              <a:rPr lang="en-US" sz="3600" dirty="0" err="1" smtClean="0">
                 <a:solidFill>
                   <a:schemeClr val="tx2"/>
                 </a:solidFill>
@@ -4351,12 +4351,8 @@
               <a:t>Mottola</a:t>
             </a:r>
             <a:r>
-              <a:rPr lang="en-US" sz="3600" baseline="30000" dirty="0" smtClean="0"/>
-              <a:t>†</a:t>
-            </a:r>
-            <a:r>
               <a:rPr lang="en-US" sz="3600" baseline="30000" dirty="0"/>
-              <a:t>⋆</a:t>
+              <a:t>⋆†</a:t>
             </a:r>
             <a:r>
               <a:rPr lang="en-US" sz="3600" dirty="0" smtClean="0">
@@ -4407,6 +4403,31 @@
             </a:pPr>
             <a:r>
               <a:rPr lang="en-US" sz="3600" baseline="30000" dirty="0"/>
+              <a:t>⋆</a:t>
+            </a:r>
+            <a:r>
+              <a:rPr lang="en-US" sz="3600" dirty="0" err="1"/>
+              <a:t>Politecnico</a:t>
+            </a:r>
+            <a:r>
+              <a:rPr lang="en-US" sz="3600" dirty="0"/>
+              <a:t> di Milano (Italy</a:t>
+            </a:r>
+            <a:r>
+              <a:rPr lang="en-US" sz="3600" dirty="0" smtClean="0"/>
+              <a:t>),</a:t>
+            </a:r>
+            <a:r>
+              <a:rPr lang="en-US" sz="3600" dirty="0" smtClean="0">
+                <a:solidFill>
+                  <a:schemeClr val="tx2"/>
+                </a:solidFill>
+                <a:latin typeface="Trebuchet MS" charset="0"/>
+              </a:rPr>
+              <a:t> </a:t>
+            </a:r>
+            <a:r>
+              <a:rPr lang="en-US" sz="3600" baseline="30000" dirty="0" smtClean="0"/>
               <a:t>†</a:t>
             </a:r>
             <a:r>
@@ -4416,37 +4437,8 @@
                 </a:solidFill>
                 <a:latin typeface="Trebuchet MS" charset="0"/>
               </a:rPr>
-              <a:t>Swedish Institute of Computer Science (SICS), </a:t>
-            </a:r>
-            <a:r>
-              <a:rPr lang="en-US" sz="3600" baseline="30000" dirty="0"/>
-              <a:t>⋆</a:t>
-            </a:r>
-            <a:r>
-              <a:rPr lang="en-US" sz="3600" dirty="0" err="1" smtClean="0"/>
-              <a:t>Politecnico</a:t>
-            </a:r>
-            <a:r>
-              <a:rPr lang="en-US" sz="3600" dirty="0" smtClean="0"/>
-              <a:t> </a:t>
-            </a:r>
-            <a:r>
-              <a:rPr lang="en-US" sz="3600" dirty="0" smtClean="0"/>
-              <a:t>di Milano (Italy)</a:t>
-            </a:r>
-            <a:endParaRPr lang="en-US" sz="3600" dirty="0" smtClean="0">
-              <a:solidFill>
-                <a:schemeClr val="tx2"/>
-              </a:solidFill>
-              <a:latin typeface="Trebuchet MS" charset="0"/>
-            </a:endParaRPr>
-          </a:p>
-          <a:p>
-            <a:pPr algn="ctr" defTabSz="830263" eaLnBrk="1" hangingPunct="1">
-              <a:spcBef>
-                <a:spcPts val="1800"/>
-              </a:spcBef>
-            </a:pPr>
+              <a:t>Swedish Institute of Computer Science (SICS</a:t>
+            </a:r>
             <a:r>
               <a:rPr lang="en-US" sz="3600" dirty="0" smtClean="0">
                 <a:solidFill>
@@ -4454,7 +4446,41 @@
                 </a:solidFill>
                 <a:latin typeface="Trebuchet MS" charset="0"/>
               </a:rPr>
-              <a:t>Contact email: </a:t>
+              <a:t>)</a:t>
+            </a:r>
+            <a:endParaRPr lang="en-US" sz="3600" dirty="0">
+              <a:solidFill>
+                <a:schemeClr val="tx2"/>
+              </a:solidFill>
+              <a:latin typeface="Trebuchet MS" charset="0"/>
+            </a:endParaRPr>
+          </a:p>
+          <a:p>
+            <a:pPr algn="ctr" defTabSz="830263" eaLnBrk="1" hangingPunct="1">
+              <a:lnSpc>
+                <a:spcPct val="80000"/>
+              </a:lnSpc>
+              <a:spcBef>
+                <a:spcPts val="1800"/>
+              </a:spcBef>
+            </a:pPr>
+            <a:r>
+              <a:rPr lang="en-US" sz="3600" dirty="0" smtClean="0">
+                <a:solidFill>
+                  <a:schemeClr val="tx2"/>
+                </a:solidFill>
+                <a:latin typeface="Trebuchet MS" charset="0"/>
+              </a:rPr>
+              <a:t>Contact </a:t>
+            </a:r>
+            <a:r>
+              <a:rPr lang="en-US" sz="3600" dirty="0" smtClean="0">
+                <a:solidFill>
+                  <a:schemeClr val="tx2"/>
+                </a:solidFill>
+                <a:latin typeface="Trebuchet MS" charset="0"/>
+              </a:rPr>
+              <a:t>email: </a:t>
             </a:r>
             <a:r>
               <a:rPr lang="en-US" sz="3600" b="1" dirty="0" err="1" smtClean="0">
@@ -6675,7 +6701,7 @@
   <p:timing>
     <p:tnLst>
       <p:par>
-        <p:cTn id="1" dur="indefinite" restart="never" nodeType="tmRoot"/>
+        <p:cTn xmlns:p14="http://schemas.microsoft.com/office/powerpoint/2010/main" id="1" dur="indefinite" restart="never" nodeType="tmRoot"/>
       </p:par>
     </p:tnLst>
   </p:timing>

</xml_diff>

<commit_message>
Slight changes in the poster. Bare bone for a new paper.
</commit_message>
<xml_diff>
--- a/ubicomp13/poster/ConesC.pptx
+++ b/ubicomp13/poster/ConesC.pptx
@@ -142,7 +142,7 @@
   </p:defaultTextStyle>
   <p:extLst>
     <p:ext uri="{EFAFB233-063F-42B5-8137-9DF3F51BA10A}">
-      <p15:sldGuideLst xmlns:p15="http://schemas.microsoft.com/office/powerpoint/2012/main" xmlns="">
+      <p15:sldGuideLst xmlns="" xmlns:p15="http://schemas.microsoft.com/office/powerpoint/2012/main">
         <p15:guide id="1" orient="horz" pos="13483">
           <p15:clr>
             <a:srgbClr val="A4A3A4"/>
@@ -4578,7 +4578,25 @@
                 </a:solidFill>
                 <a:latin typeface="Trebuchet MS" charset="0"/>
               </a:rPr>
-              <a:t>Wireless Sensor Networks for Healthcare Systems</a:t>
+              <a:t>Example: Wireless </a:t>
+            </a:r>
+            <a:r>
+              <a:rPr lang="en-US" sz="7200" b="1" i="1" dirty="0" smtClean="0">
+                <a:solidFill>
+                  <a:schemeClr val="tx2"/>
+                </a:solidFill>
+                <a:latin typeface="Trebuchet MS" charset="0"/>
+              </a:rPr>
+              <a:t>Sensor Networks for </a:t>
+            </a:r>
+            <a:r>
+              <a:rPr lang="en-US" sz="7200" b="1" i="1" dirty="0" smtClean="0">
+                <a:solidFill>
+                  <a:schemeClr val="tx2"/>
+                </a:solidFill>
+                <a:latin typeface="Trebuchet MS" charset="0"/>
+              </a:rPr>
+              <a:t>Healthcare</a:t>
             </a:r>
             <a:endParaRPr lang="en-US" sz="7200" b="1" i="1" dirty="0">
               <a:solidFill>
@@ -5686,7 +5704,7 @@
         </p:nvSpPr>
         <p:spPr>
           <a:xfrm>
-            <a:off x="1036754" y="36739585"/>
+            <a:off x="1096046" y="36739585"/>
             <a:ext cx="11887553" cy="2585323"/>
           </a:xfrm>
           <a:prstGeom prst="rect">
@@ -5728,19 +5746,13 @@
               <a:rPr lang="en-US" sz="5400" b="1" i="1" dirty="0" smtClean="0">
                 <a:latin typeface="+mj-lt"/>
               </a:rPr>
-              <a:t>Evaluation on a </a:t>
-            </a:r>
-            <a:r>
-              <a:rPr lang="en-US" sz="5400" b="1" i="1" dirty="0">
-                <a:latin typeface="+mj-lt"/>
-              </a:rPr>
-              <a:t>r</a:t>
+              <a:t>Evaluation on </a:t>
             </a:r>
             <a:r>
               <a:rPr lang="en-US" sz="5400" b="1" i="1" dirty="0" smtClean="0">
                 <a:latin typeface="+mj-lt"/>
               </a:rPr>
-              <a:t>eal application</a:t>
+              <a:t>real applications</a:t>
             </a:r>
             <a:endParaRPr lang="en-US" sz="5400" b="1" i="1" dirty="0">
               <a:latin typeface="+mj-lt"/>
@@ -6488,10 +6500,16 @@
           <a:p>
             <a:pPr algn="ctr"/>
             <a:r>
+              <a:rPr lang="en-US" sz="5400" b="1" i="1" dirty="0">
+                <a:latin typeface="+mj-lt"/>
+              </a:rPr>
+              <a:t>E</a:t>
+            </a:r>
+            <a:r>
               <a:rPr lang="en-US" sz="5400" b="1" i="1" dirty="0" smtClean="0">
                 <a:latin typeface="+mj-lt"/>
               </a:rPr>
-              <a:t>Usage example</a:t>
+              <a:t>xample</a:t>
             </a:r>
             <a:endParaRPr lang="en-US" sz="5400" b="1" i="1" dirty="0">
               <a:latin typeface="+mj-lt"/>
@@ -6716,7 +6734,7 @@
               <a:t>c</a:t>
             </a:r>
             <a:r>
-              <a:rPr lang="en-US" sz="1600" smtClean="0">
+              <a:rPr lang="en-US" sz="1600" dirty="0" smtClean="0">
                 <a:latin typeface="Courier"/>
                 <a:cs typeface="Courier"/>
               </a:rPr>

</xml_diff>